<commit_message>
added a slide regarding some issues like editor and sync
</commit_message>
<xml_diff>
--- a/Just git it.pptx
+++ b/Just git it.pptx
@@ -4409,7 +4409,12 @@
             <p:ph idx="1"/>
           </p:nvPr>
         </p:nvSpPr>
-        <p:spPr/>
+        <p:spPr>
+          <a:xfrm>
+            <a:off x="838200" y="1825625"/>
+            <a:ext cx="10515600" cy="1093066"/>
+          </a:xfrm>
+        </p:spPr>
         <p:txBody>
           <a:bodyPr/>
           <a:lstStyle/>
@@ -4429,9 +4434,286 @@
               <a:t>git</a:t>
             </a:r>
             <a:r>
-              <a:rPr lang="en-US" smtClean="0"/>
+              <a:rPr lang="en-US" dirty="0" smtClean="0"/>
               <a:t> bash</a:t>
             </a:r>
+          </a:p>
+          <a:p>
+            <a:endParaRPr lang="en-US" dirty="0"/>
+          </a:p>
+        </p:txBody>
+      </p:sp>
+      <p:sp>
+        <p:nvSpPr>
+          <p:cNvPr id="8" name="Title 1"/>
+          <p:cNvSpPr txBox="1">
+            <a:spLocks/>
+          </p:cNvSpPr>
+          <p:nvPr/>
+        </p:nvSpPr>
+        <p:spPr>
+          <a:xfrm>
+            <a:off x="990600" y="3334619"/>
+            <a:ext cx="10515600" cy="1325563"/>
+          </a:xfrm>
+          <a:prstGeom prst="rect">
+            <a:avLst/>
+          </a:prstGeom>
+        </p:spPr>
+        <p:txBody>
+          <a:bodyPr vert="horz" lIns="91440" tIns="45720" rIns="91440" bIns="45720" rtlCol="0" anchor="ctr">
+            <a:normAutofit/>
+          </a:bodyPr>
+          <a:lstStyle>
+            <a:lvl1pPr algn="l" defTabSz="914400" rtl="0" eaLnBrk="1" latinLnBrk="0" hangingPunct="1">
+              <a:lnSpc>
+                <a:spcPct val="90000"/>
+              </a:lnSpc>
+              <a:spcBef>
+                <a:spcPct val="0"/>
+              </a:spcBef>
+              <a:buNone/>
+              <a:defRPr sz="4400" kern="1200">
+                <a:solidFill>
+                  <a:schemeClr val="tx1"/>
+                </a:solidFill>
+                <a:latin typeface="+mj-lt"/>
+                <a:ea typeface="+mj-ea"/>
+                <a:cs typeface="+mj-cs"/>
+              </a:defRPr>
+            </a:lvl1pPr>
+          </a:lstStyle>
+          <a:p>
+            <a:r>
+              <a:rPr lang="en-US" dirty="0" smtClean="0"/>
+              <a:t>Sync PAIN</a:t>
+            </a:r>
+            <a:endParaRPr lang="en-US" dirty="0"/>
+          </a:p>
+        </p:txBody>
+      </p:sp>
+      <p:sp>
+        <p:nvSpPr>
+          <p:cNvPr id="9" name="Content Placeholder 2"/>
+          <p:cNvSpPr txBox="1">
+            <a:spLocks/>
+          </p:cNvSpPr>
+          <p:nvPr/>
+        </p:nvSpPr>
+        <p:spPr>
+          <a:xfrm>
+            <a:off x="990600" y="4795119"/>
+            <a:ext cx="10515600" cy="1093066"/>
+          </a:xfrm>
+          <a:prstGeom prst="rect">
+            <a:avLst/>
+          </a:prstGeom>
+        </p:spPr>
+        <p:txBody>
+          <a:bodyPr vert="horz" lIns="91440" tIns="45720" rIns="91440" bIns="45720" rtlCol="0">
+            <a:normAutofit/>
+          </a:bodyPr>
+          <a:lstStyle>
+            <a:lvl1pPr marL="228600" indent="-228600" algn="l" defTabSz="914400" rtl="0" eaLnBrk="1" latinLnBrk="0" hangingPunct="1">
+              <a:lnSpc>
+                <a:spcPct val="90000"/>
+              </a:lnSpc>
+              <a:spcBef>
+                <a:spcPts val="1000"/>
+              </a:spcBef>
+              <a:buFont typeface="Arial" panose="020B0604020202020204" pitchFamily="34" charset="0"/>
+              <a:buChar char="•"/>
+              <a:defRPr sz="2800" kern="1200">
+                <a:solidFill>
+                  <a:schemeClr val="tx1"/>
+                </a:solidFill>
+                <a:latin typeface="+mn-lt"/>
+                <a:ea typeface="+mn-ea"/>
+                <a:cs typeface="+mn-cs"/>
+              </a:defRPr>
+            </a:lvl1pPr>
+            <a:lvl2pPr marL="685800" indent="-228600" algn="l" defTabSz="914400" rtl="0" eaLnBrk="1" latinLnBrk="0" hangingPunct="1">
+              <a:lnSpc>
+                <a:spcPct val="90000"/>
+              </a:lnSpc>
+              <a:spcBef>
+                <a:spcPts val="500"/>
+              </a:spcBef>
+              <a:buFont typeface="Arial" panose="020B0604020202020204" pitchFamily="34" charset="0"/>
+              <a:buChar char="•"/>
+              <a:defRPr sz="2400" kern="1200">
+                <a:solidFill>
+                  <a:schemeClr val="tx1"/>
+                </a:solidFill>
+                <a:latin typeface="+mn-lt"/>
+                <a:ea typeface="+mn-ea"/>
+                <a:cs typeface="+mn-cs"/>
+              </a:defRPr>
+            </a:lvl2pPr>
+            <a:lvl3pPr marL="1143000" indent="-228600" algn="l" defTabSz="914400" rtl="0" eaLnBrk="1" latinLnBrk="0" hangingPunct="1">
+              <a:lnSpc>
+                <a:spcPct val="90000"/>
+              </a:lnSpc>
+              <a:spcBef>
+                <a:spcPts val="500"/>
+              </a:spcBef>
+              <a:buFont typeface="Arial" panose="020B0604020202020204" pitchFamily="34" charset="0"/>
+              <a:buChar char="•"/>
+              <a:defRPr sz="2000" kern="1200">
+                <a:solidFill>
+                  <a:schemeClr val="tx1"/>
+                </a:solidFill>
+                <a:latin typeface="+mn-lt"/>
+                <a:ea typeface="+mn-ea"/>
+                <a:cs typeface="+mn-cs"/>
+              </a:defRPr>
+            </a:lvl3pPr>
+            <a:lvl4pPr marL="1600200" indent="-228600" algn="l" defTabSz="914400" rtl="0" eaLnBrk="1" latinLnBrk="0" hangingPunct="1">
+              <a:lnSpc>
+                <a:spcPct val="90000"/>
+              </a:lnSpc>
+              <a:spcBef>
+                <a:spcPts val="500"/>
+              </a:spcBef>
+              <a:buFont typeface="Arial" panose="020B0604020202020204" pitchFamily="34" charset="0"/>
+              <a:buChar char="•"/>
+              <a:defRPr sz="1800" kern="1200">
+                <a:solidFill>
+                  <a:schemeClr val="tx1"/>
+                </a:solidFill>
+                <a:latin typeface="+mn-lt"/>
+                <a:ea typeface="+mn-ea"/>
+                <a:cs typeface="+mn-cs"/>
+              </a:defRPr>
+            </a:lvl4pPr>
+            <a:lvl5pPr marL="2057400" indent="-228600" algn="l" defTabSz="914400" rtl="0" eaLnBrk="1" latinLnBrk="0" hangingPunct="1">
+              <a:lnSpc>
+                <a:spcPct val="90000"/>
+              </a:lnSpc>
+              <a:spcBef>
+                <a:spcPts val="500"/>
+              </a:spcBef>
+              <a:buFont typeface="Arial" panose="020B0604020202020204" pitchFamily="34" charset="0"/>
+              <a:buChar char="•"/>
+              <a:defRPr sz="1800" kern="1200">
+                <a:solidFill>
+                  <a:schemeClr val="tx1"/>
+                </a:solidFill>
+                <a:latin typeface="+mn-lt"/>
+                <a:ea typeface="+mn-ea"/>
+                <a:cs typeface="+mn-cs"/>
+              </a:defRPr>
+            </a:lvl5pPr>
+            <a:lvl6pPr marL="2514600" indent="-228600" algn="l" defTabSz="914400" rtl="0" eaLnBrk="1" latinLnBrk="0" hangingPunct="1">
+              <a:lnSpc>
+                <a:spcPct val="90000"/>
+              </a:lnSpc>
+              <a:spcBef>
+                <a:spcPts val="500"/>
+              </a:spcBef>
+              <a:buFont typeface="Arial" panose="020B0604020202020204" pitchFamily="34" charset="0"/>
+              <a:buChar char="•"/>
+              <a:defRPr sz="1800" kern="1200">
+                <a:solidFill>
+                  <a:schemeClr val="tx1"/>
+                </a:solidFill>
+                <a:latin typeface="+mn-lt"/>
+                <a:ea typeface="+mn-ea"/>
+                <a:cs typeface="+mn-cs"/>
+              </a:defRPr>
+            </a:lvl6pPr>
+            <a:lvl7pPr marL="2971800" indent="-228600" algn="l" defTabSz="914400" rtl="0" eaLnBrk="1" latinLnBrk="0" hangingPunct="1">
+              <a:lnSpc>
+                <a:spcPct val="90000"/>
+              </a:lnSpc>
+              <a:spcBef>
+                <a:spcPts val="500"/>
+              </a:spcBef>
+              <a:buFont typeface="Arial" panose="020B0604020202020204" pitchFamily="34" charset="0"/>
+              <a:buChar char="•"/>
+              <a:defRPr sz="1800" kern="1200">
+                <a:solidFill>
+                  <a:schemeClr val="tx1"/>
+                </a:solidFill>
+                <a:latin typeface="+mn-lt"/>
+                <a:ea typeface="+mn-ea"/>
+                <a:cs typeface="+mn-cs"/>
+              </a:defRPr>
+            </a:lvl7pPr>
+            <a:lvl8pPr marL="3429000" indent="-228600" algn="l" defTabSz="914400" rtl="0" eaLnBrk="1" latinLnBrk="0" hangingPunct="1">
+              <a:lnSpc>
+                <a:spcPct val="90000"/>
+              </a:lnSpc>
+              <a:spcBef>
+                <a:spcPts val="500"/>
+              </a:spcBef>
+              <a:buFont typeface="Arial" panose="020B0604020202020204" pitchFamily="34" charset="0"/>
+              <a:buChar char="•"/>
+              <a:defRPr sz="1800" kern="1200">
+                <a:solidFill>
+                  <a:schemeClr val="tx1"/>
+                </a:solidFill>
+                <a:latin typeface="+mn-lt"/>
+                <a:ea typeface="+mn-ea"/>
+                <a:cs typeface="+mn-cs"/>
+              </a:defRPr>
+            </a:lvl8pPr>
+            <a:lvl9pPr marL="3886200" indent="-228600" algn="l" defTabSz="914400" rtl="0" eaLnBrk="1" latinLnBrk="0" hangingPunct="1">
+              <a:lnSpc>
+                <a:spcPct val="90000"/>
+              </a:lnSpc>
+              <a:spcBef>
+                <a:spcPts val="500"/>
+              </a:spcBef>
+              <a:buFont typeface="Arial" panose="020B0604020202020204" pitchFamily="34" charset="0"/>
+              <a:buChar char="•"/>
+              <a:defRPr sz="1800" kern="1200">
+                <a:solidFill>
+                  <a:schemeClr val="tx1"/>
+                </a:solidFill>
+                <a:latin typeface="+mn-lt"/>
+                <a:ea typeface="+mn-ea"/>
+                <a:cs typeface="+mn-cs"/>
+              </a:defRPr>
+            </a:lvl9pPr>
+          </a:lstStyle>
+          <a:p>
+            <a:pPr marL="0" indent="0">
+              <a:buNone/>
+            </a:pPr>
+            <a:r>
+              <a:rPr lang="en-US" dirty="0" smtClean="0"/>
+              <a:t>If it happen, refer</a:t>
+            </a:r>
+          </a:p>
+          <a:p>
+            <a:pPr marL="0" indent="0">
+              <a:buNone/>
+            </a:pPr>
+            <a:r>
+              <a:rPr lang="en-US" dirty="0" smtClean="0">
+                <a:hlinkClick r:id="rId2"/>
+              </a:rPr>
+              <a:t>https</a:t>
+            </a:r>
+            <a:r>
+              <a:rPr lang="en-US">
+                <a:hlinkClick r:id="rId2"/>
+              </a:rPr>
+              <a:t>://</a:t>
+            </a:r>
+            <a:r>
+              <a:rPr lang="en-US" smtClean="0">
+                <a:hlinkClick r:id="rId2"/>
+              </a:rPr>
+              <a:t>www.atlassian.com/git/tutorials/syncing</a:t>
+            </a:r>
+            <a:endParaRPr lang="en-US" smtClean="0"/>
+          </a:p>
+          <a:p>
+            <a:pPr marL="0" indent="0">
+              <a:buNone/>
+            </a:pPr>
             <a:endParaRPr lang="en-US" dirty="0" smtClean="0"/>
           </a:p>
           <a:p>
@@ -4586,16 +4868,13 @@
             </a:r>
             <a:r>
               <a:rPr lang="en-US" dirty="0" smtClean="0"/>
-              <a:t> remote add origin &lt;</a:t>
-            </a:r>
-            <a:r>
-              <a:rPr lang="en-US" dirty="0" err="1" smtClean="0"/>
-              <a:t>url</a:t>
-            </a:r>
-            <a:r>
-              <a:rPr lang="en-US" dirty="0" smtClean="0"/>
-              <a:t>&gt;</a:t>
-            </a:r>
+              <a:t> remote add origin </a:t>
+            </a:r>
+            <a:r>
+              <a:rPr lang="en-US" dirty="0" smtClean="0"/>
+              <a:t>&lt;remote&gt;</a:t>
+            </a:r>
+            <a:endParaRPr lang="en-US" dirty="0" smtClean="0"/>
           </a:p>
           <a:p>
             <a:r>
@@ -4618,8 +4897,13 @@
             </a:r>
             <a:r>
               <a:rPr lang="en-US" dirty="0" smtClean="0"/>
-              <a:t> pull</a:t>
-            </a:r>
+              <a:t> </a:t>
+            </a:r>
+            <a:r>
+              <a:rPr lang="en-US" dirty="0" smtClean="0"/>
+              <a:t>pull &lt;remote&gt;</a:t>
+            </a:r>
+            <a:endParaRPr lang="en-US" dirty="0" smtClean="0"/>
           </a:p>
           <a:p>
             <a:r>

</xml_diff>